<commit_message>
added exam prep db
</commit_message>
<xml_diff>
--- a/MathFundamnetalsOfProgramming/Graphs/Ойлеров цикъл.pptx
+++ b/MathFundamnetalsOfProgramming/Graphs/Ойлеров цикъл.pptx
@@ -307,7 +307,7 @@
           <a:p>
             <a:fld id="{FEDF48EF-79B6-4B61-920C-F4B85B30ABB2}" type="datetimeFigureOut">
               <a:rPr lang="en-US" smtClean="0"/>
-              <a:t>5/5/2021</a:t>
+              <a:t>5/28/2021</a:t>
             </a:fld>
             <a:endParaRPr lang="en-US"/>
           </a:p>
@@ -582,7 +582,7 @@
           <a:p>
             <a:fld id="{FEDF48EF-79B6-4B61-920C-F4B85B30ABB2}" type="datetimeFigureOut">
               <a:rPr lang="en-US" smtClean="0"/>
-              <a:t>5/5/2021</a:t>
+              <a:t>5/28/2021</a:t>
             </a:fld>
             <a:endParaRPr lang="en-US"/>
           </a:p>
@@ -776,7 +776,7 @@
           <a:p>
             <a:fld id="{FEDF48EF-79B6-4B61-920C-F4B85B30ABB2}" type="datetimeFigureOut">
               <a:rPr lang="en-US" smtClean="0"/>
-              <a:t>5/5/2021</a:t>
+              <a:t>5/28/2021</a:t>
             </a:fld>
             <a:endParaRPr lang="en-US"/>
           </a:p>
@@ -1049,7 +1049,7 @@
           <a:p>
             <a:fld id="{FEDF48EF-79B6-4B61-920C-F4B85B30ABB2}" type="datetimeFigureOut">
               <a:rPr lang="en-US" smtClean="0"/>
-              <a:t>5/5/2021</a:t>
+              <a:t>5/28/2021</a:t>
             </a:fld>
             <a:endParaRPr lang="en-US"/>
           </a:p>
@@ -1390,7 +1390,7 @@
           <a:p>
             <a:fld id="{FEDF48EF-79B6-4B61-920C-F4B85B30ABB2}" type="datetimeFigureOut">
               <a:rPr lang="en-US" smtClean="0"/>
-              <a:t>5/5/2021</a:t>
+              <a:t>5/28/2021</a:t>
             </a:fld>
             <a:endParaRPr lang="en-US"/>
           </a:p>
@@ -2013,7 +2013,7 @@
           <a:p>
             <a:fld id="{FEDF48EF-79B6-4B61-920C-F4B85B30ABB2}" type="datetimeFigureOut">
               <a:rPr lang="en-US" smtClean="0"/>
-              <a:t>5/5/2021</a:t>
+              <a:t>5/28/2021</a:t>
             </a:fld>
             <a:endParaRPr lang="en-US"/>
           </a:p>
@@ -2873,7 +2873,7 @@
           <a:p>
             <a:fld id="{FEDF48EF-79B6-4B61-920C-F4B85B30ABB2}" type="datetimeFigureOut">
               <a:rPr lang="en-US" smtClean="0"/>
-              <a:t>5/5/2021</a:t>
+              <a:t>5/28/2021</a:t>
             </a:fld>
             <a:endParaRPr lang="en-US"/>
           </a:p>
@@ -3043,7 +3043,7 @@
           <a:p>
             <a:fld id="{FEDF48EF-79B6-4B61-920C-F4B85B30ABB2}" type="datetimeFigureOut">
               <a:rPr lang="en-US" smtClean="0"/>
-              <a:t>5/5/2021</a:t>
+              <a:t>5/28/2021</a:t>
             </a:fld>
             <a:endParaRPr lang="en-US"/>
           </a:p>
@@ -3223,7 +3223,7 @@
           <a:p>
             <a:fld id="{FEDF48EF-79B6-4B61-920C-F4B85B30ABB2}" type="datetimeFigureOut">
               <a:rPr lang="en-US" smtClean="0"/>
-              <a:t>5/5/2021</a:t>
+              <a:t>5/28/2021</a:t>
             </a:fld>
             <a:endParaRPr lang="en-US"/>
           </a:p>
@@ -3393,7 +3393,7 @@
           <a:p>
             <a:fld id="{FEDF48EF-79B6-4B61-920C-F4B85B30ABB2}" type="datetimeFigureOut">
               <a:rPr lang="en-US" smtClean="0"/>
-              <a:t>5/5/2021</a:t>
+              <a:t>5/28/2021</a:t>
             </a:fld>
             <a:endParaRPr lang="en-US"/>
           </a:p>
@@ -3640,7 +3640,7 @@
           <a:p>
             <a:fld id="{FEDF48EF-79B6-4B61-920C-F4B85B30ABB2}" type="datetimeFigureOut">
               <a:rPr lang="en-US" smtClean="0"/>
-              <a:t>5/5/2021</a:t>
+              <a:t>5/28/2021</a:t>
             </a:fld>
             <a:endParaRPr lang="en-US"/>
           </a:p>
@@ -3932,7 +3932,7 @@
           <a:p>
             <a:fld id="{FEDF48EF-79B6-4B61-920C-F4B85B30ABB2}" type="datetimeFigureOut">
               <a:rPr lang="en-US" smtClean="0"/>
-              <a:t>5/5/2021</a:t>
+              <a:t>5/28/2021</a:t>
             </a:fld>
             <a:endParaRPr lang="en-US"/>
           </a:p>
@@ -4376,7 +4376,7 @@
           <a:p>
             <a:fld id="{FEDF48EF-79B6-4B61-920C-F4B85B30ABB2}" type="datetimeFigureOut">
               <a:rPr lang="en-US" smtClean="0"/>
-              <a:t>5/5/2021</a:t>
+              <a:t>5/28/2021</a:t>
             </a:fld>
             <a:endParaRPr lang="en-US"/>
           </a:p>
@@ -4494,7 +4494,7 @@
           <a:p>
             <a:fld id="{FEDF48EF-79B6-4B61-920C-F4B85B30ABB2}" type="datetimeFigureOut">
               <a:rPr lang="en-US" smtClean="0"/>
-              <a:t>5/5/2021</a:t>
+              <a:t>5/28/2021</a:t>
             </a:fld>
             <a:endParaRPr lang="en-US"/>
           </a:p>
@@ -4589,7 +4589,7 @@
           <a:p>
             <a:fld id="{FEDF48EF-79B6-4B61-920C-F4B85B30ABB2}" type="datetimeFigureOut">
               <a:rPr lang="en-US" smtClean="0"/>
-              <a:t>5/5/2021</a:t>
+              <a:t>5/28/2021</a:t>
             </a:fld>
             <a:endParaRPr lang="en-US"/>
           </a:p>
@@ -4868,7 +4868,7 @@
           <a:p>
             <a:fld id="{FEDF48EF-79B6-4B61-920C-F4B85B30ABB2}" type="datetimeFigureOut">
               <a:rPr lang="en-US" smtClean="0"/>
-              <a:t>5/5/2021</a:t>
+              <a:t>5/28/2021</a:t>
             </a:fld>
             <a:endParaRPr lang="en-US"/>
           </a:p>
@@ -5143,7 +5143,7 @@
           <a:p>
             <a:fld id="{FEDF48EF-79B6-4B61-920C-F4B85B30ABB2}" type="datetimeFigureOut">
               <a:rPr lang="en-US" smtClean="0"/>
-              <a:t>5/5/2021</a:t>
+              <a:t>5/28/2021</a:t>
             </a:fld>
             <a:endParaRPr lang="en-US"/>
           </a:p>
@@ -5572,7 +5572,7 @@
           <a:p>
             <a:fld id="{FEDF48EF-79B6-4B61-920C-F4B85B30ABB2}" type="datetimeFigureOut">
               <a:rPr lang="en-US" smtClean="0"/>
-              <a:t>5/5/2021</a:t>
+              <a:t>5/28/2021</a:t>
             </a:fld>
             <a:endParaRPr lang="en-US"/>
           </a:p>
@@ -6334,13 +6334,11 @@
             </a:r>
             <a:r>
               <a:rPr lang="en-US" dirty="0"/>
-              <a:t>.</a:t>
-            </a:r>
-          </a:p>
-          <a:p>
+              <a:t>, </a:t>
+            </a:r>
             <a:r>
               <a:rPr lang="bg-BG" dirty="0"/>
-              <a:t>Трябва да започнем от един от двата върха с нечетна степен.</a:t>
+              <a:t>като трябва да започнем от един от двата върха с нечетна степен.</a:t>
             </a:r>
             <a:endParaRPr lang="en-US" dirty="0"/>
           </a:p>
@@ -6652,15 +6650,6 @@
             </a:r>
           </a:p>
           <a:p>
-            <a:endParaRPr lang="ru-RU" dirty="0"/>
-          </a:p>
-          <a:p>
-            <a:r>
-              <a:rPr lang="bg-BG" dirty="0"/>
-              <a:t>Ако знаете, че графът съдържа ойлеров цикъл, пътят може да започне от всеки връх.</a:t>
-            </a:r>
-          </a:p>
-          <a:p>
             <a:r>
               <a:rPr lang="bg-BG" dirty="0"/>
               <a:t>Пример: </a:t>
@@ -6965,16 +6954,7 @@
           <a:p>
             <a:r>
               <a:rPr lang="ru-RU" dirty="0"/>
-              <a:t>а) Всички върхове с ненулева степен са свързани. Ние не се интересуваме от върхове с нулева степен, защото те не принадлежат към Ойлеров цикъл или Път (ние разглеждаме само всички ребра).</a:t>
-            </a:r>
-          </a:p>
-          <a:p>
-            <a:pPr marL="0" indent="0">
-              <a:buNone/>
-            </a:pPr>
-            <a:r>
-              <a:rPr lang="ru-RU" dirty="0"/>
-              <a:t>    b) Всички върхове имат четна степен</a:t>
+              <a:t>Всички върхове имат четна степен</a:t>
             </a:r>
             <a:endParaRPr lang="en-US" dirty="0"/>
           </a:p>
@@ -7192,19 +7172,17 @@
       </p:sp>
       <p:pic>
         <p:nvPicPr>
-          <p:cNvPr id="8" name="Content Placeholder 7">
+          <p:cNvPr id="5" name="Picture 4">
             <a:extLst>
               <a:ext uri="{FF2B5EF4-FFF2-40B4-BE49-F238E27FC236}">
-                <a16:creationId xmlns:a16="http://schemas.microsoft.com/office/drawing/2014/main" id="{E7620DD8-CECB-4804-80F9-8616BFFB8F25}"/>
+                <a16:creationId xmlns:a16="http://schemas.microsoft.com/office/drawing/2014/main" id="{BFCA16D3-FEF2-489D-9652-A230DA1594F0}"/>
               </a:ext>
             </a:extLst>
           </p:cNvPr>
           <p:cNvPicPr>
-            <a:picLocks noGrp="1" noChangeAspect="1"/>
+            <a:picLocks noChangeAspect="1"/>
           </p:cNvPicPr>
-          <p:nvPr>
-            <p:ph idx="1"/>
-          </p:nvPr>
+          <p:nvPr/>
         </p:nvPicPr>
         <p:blipFill>
           <a:blip r:embed="rId2"/>
@@ -7214,9 +7192,12 @@
         </p:blipFill>
         <p:spPr>
           <a:xfrm>
-            <a:off x="2625188" y="2318830"/>
-            <a:ext cx="6341258" cy="3638085"/>
+            <a:off x="2365575" y="2465333"/>
+            <a:ext cx="6820852" cy="3438317"/>
           </a:xfrm>
+          <a:prstGeom prst="rect">
+            <a:avLst/>
+          </a:prstGeom>
         </p:spPr>
       </p:pic>
     </p:spTree>
@@ -7280,19 +7261,17 @@
       </p:sp>
       <p:pic>
         <p:nvPicPr>
-          <p:cNvPr id="5" name="Content Placeholder 4">
+          <p:cNvPr id="8" name="Picture 7">
             <a:extLst>
               <a:ext uri="{FF2B5EF4-FFF2-40B4-BE49-F238E27FC236}">
-                <a16:creationId xmlns:a16="http://schemas.microsoft.com/office/drawing/2014/main" id="{5D7A58F8-9004-470D-BCA3-C4AA0F82D6CD}"/>
+                <a16:creationId xmlns:a16="http://schemas.microsoft.com/office/drawing/2014/main" id="{3F2E4AF3-9276-458F-9D6E-A89153184BBE}"/>
               </a:ext>
             </a:extLst>
           </p:cNvPr>
           <p:cNvPicPr>
-            <a:picLocks noGrp="1" noChangeAspect="1"/>
+            <a:picLocks noChangeAspect="1"/>
           </p:cNvPicPr>
-          <p:nvPr>
-            <p:ph idx="1"/>
-          </p:nvPr>
+          <p:nvPr/>
         </p:nvPicPr>
         <p:blipFill>
           <a:blip r:embed="rId2"/>
@@ -7302,9 +7281,12 @@
         </p:blipFill>
         <p:spPr>
           <a:xfrm>
-            <a:off x="2370337" y="1853248"/>
-            <a:ext cx="6587231" cy="4148057"/>
+            <a:off x="2079363" y="2089119"/>
+            <a:ext cx="7038975" cy="3638550"/>
           </a:xfrm>
+          <a:prstGeom prst="rect">
+            <a:avLst/>
+          </a:prstGeom>
         </p:spPr>
       </p:pic>
     </p:spTree>

</xml_diff>